<commit_message>
v1.0 FinalProject PPT說明 1. 專案需求 2. BreakDown 3. 分工表
</commit_message>
<xml_diff>
--- a/DevelopmentLog/Pingpong.pptx
+++ b/DevelopmentLog/Pingpong.pptx
@@ -5,10 +5,10 @@
     <p:sldMasterId id="2147483648" r:id="rId1"/>
   </p:sldMasterIdLst>
   <p:notesMasterIdLst>
-    <p:notesMasterId r:id="rId20"/>
+    <p:notesMasterId r:id="rId21"/>
   </p:notesMasterIdLst>
   <p:handoutMasterIdLst>
-    <p:handoutMasterId r:id="rId21"/>
+    <p:handoutMasterId r:id="rId22"/>
   </p:handoutMasterIdLst>
   <p:sldIdLst>
     <p:sldId id="1269" r:id="rId2"/>
@@ -26,9 +26,10 @@
     <p:sldId id="1900" r:id="rId14"/>
     <p:sldId id="1908" r:id="rId15"/>
     <p:sldId id="1679" r:id="rId16"/>
-    <p:sldId id="1914" r:id="rId17"/>
-    <p:sldId id="1689" r:id="rId18"/>
-    <p:sldId id="1905" r:id="rId19"/>
+    <p:sldId id="1920" r:id="rId17"/>
+    <p:sldId id="1914" r:id="rId18"/>
+    <p:sldId id="1689" r:id="rId19"/>
+    <p:sldId id="1905" r:id="rId20"/>
   </p:sldIdLst>
   <p:sldSz cx="12192000" cy="6858000"/>
   <p:notesSz cx="6858000" cy="9144000"/>
@@ -179,6 +180,7 @@
         </p14:section>
         <p14:section name="控管紀錄" id="{62F68368-A3FC-4474-B641-5FE861CF35CE}">
           <p14:sldIdLst>
+            <p14:sldId id="1920"/>
             <p14:sldId id="1914"/>
             <p14:sldId id="1689"/>
             <p14:sldId id="1905"/>
@@ -301,7 +303,7 @@
           <a:p>
             <a:fld id="{7829F8E0-05F2-4742-BB97-D2E4F51035C8}" type="datetimeFigureOut">
               <a:rPr lang="zh-TW" altLang="en-US" smtClean="0"/>
-              <a:t>2022/4/24</a:t>
+              <a:t>2022/4/29</a:t>
             </a:fld>
             <a:endParaRPr lang="zh-TW" altLang="en-US"/>
           </a:p>
@@ -467,7 +469,7 @@
           <a:p>
             <a:fld id="{2CB905C5-9D54-40E2-B40C-7996280CAB02}" type="datetimeFigureOut">
               <a:rPr lang="zh-TW" altLang="en-US" smtClean="0"/>
-              <a:t>2022/4/24</a:t>
+              <a:t>2022/4/29</a:t>
             </a:fld>
             <a:endParaRPr lang="zh-TW" altLang="en-US"/>
           </a:p>
@@ -1718,7 +1720,7 @@
           <a:p>
             <a:fld id="{6159871E-D63C-497D-8F95-E4A7E1968E41}" type="datetime1">
               <a:rPr lang="zh-TW" altLang="en-US" smtClean="0"/>
-              <a:t>2022/4/24</a:t>
+              <a:t>2022/4/29</a:t>
             </a:fld>
             <a:endParaRPr lang="zh-TW" altLang="en-US"/>
           </a:p>
@@ -1886,7 +1888,7 @@
           <a:p>
             <a:fld id="{A77C9BCE-B134-412F-AA9E-EF069E9432DF}" type="datetime1">
               <a:rPr lang="zh-TW" altLang="en-US" smtClean="0"/>
-              <a:t>2022/4/24</a:t>
+              <a:t>2022/4/29</a:t>
             </a:fld>
             <a:endParaRPr lang="zh-TW" altLang="en-US"/>
           </a:p>
@@ -2064,7 +2066,7 @@
           <a:p>
             <a:fld id="{323677BD-9BFE-420A-AF3D-81D697864505}" type="datetime1">
               <a:rPr lang="zh-TW" altLang="en-US" smtClean="0"/>
-              <a:t>2022/4/24</a:t>
+              <a:t>2022/4/29</a:t>
             </a:fld>
             <a:endParaRPr lang="zh-TW" altLang="en-US"/>
           </a:p>
@@ -2259,7 +2261,7 @@
           <a:p>
             <a:fld id="{1A45E334-A8B4-4231-9966-8CEF9140F055}" type="datetime1">
               <a:rPr lang="zh-TW" altLang="en-US" smtClean="0"/>
-              <a:t>2022/4/24</a:t>
+              <a:t>2022/4/29</a:t>
             </a:fld>
             <a:endParaRPr lang="zh-TW" altLang="en-US"/>
           </a:p>
@@ -2504,7 +2506,7 @@
           <a:p>
             <a:fld id="{3F3BFEC3-B45F-4FCE-B90B-B7A3BAD0E815}" type="datetime1">
               <a:rPr lang="zh-TW" altLang="en-US" smtClean="0"/>
-              <a:t>2022/4/24</a:t>
+              <a:t>2022/4/29</a:t>
             </a:fld>
             <a:endParaRPr lang="zh-TW" altLang="en-US"/>
           </a:p>
@@ -2733,7 +2735,7 @@
           <a:p>
             <a:fld id="{330F7733-B2DA-4822-A2BA-7F8B570BCEA4}" type="datetime1">
               <a:rPr lang="zh-TW" altLang="en-US" smtClean="0"/>
-              <a:t>2022/4/24</a:t>
+              <a:t>2022/4/29</a:t>
             </a:fld>
             <a:endParaRPr lang="zh-TW" altLang="en-US"/>
           </a:p>
@@ -3097,7 +3099,7 @@
           <a:p>
             <a:fld id="{67668710-0854-41DA-B800-CD53DFA64675}" type="datetime1">
               <a:rPr lang="zh-TW" altLang="en-US" smtClean="0"/>
-              <a:t>2022/4/24</a:t>
+              <a:t>2022/4/29</a:t>
             </a:fld>
             <a:endParaRPr lang="zh-TW" altLang="en-US"/>
           </a:p>
@@ -3214,7 +3216,7 @@
           <a:p>
             <a:fld id="{F3804869-B0AF-4137-A72A-7098933C473A}" type="datetime1">
               <a:rPr lang="zh-TW" altLang="en-US" smtClean="0"/>
-              <a:t>2022/4/24</a:t>
+              <a:t>2022/4/29</a:t>
             </a:fld>
             <a:endParaRPr lang="zh-TW" altLang="en-US"/>
           </a:p>
@@ -3309,7 +3311,7 @@
           <a:p>
             <a:fld id="{FDB5B0B8-23D9-453E-98B2-7DE711E7A867}" type="datetime1">
               <a:rPr lang="zh-TW" altLang="en-US" smtClean="0"/>
-              <a:t>2022/4/24</a:t>
+              <a:t>2022/4/29</a:t>
             </a:fld>
             <a:endParaRPr lang="zh-TW" altLang="en-US"/>
           </a:p>
@@ -3584,7 +3586,7 @@
           <a:p>
             <a:fld id="{03ED102F-296F-4D14-A812-50E354B97527}" type="datetime1">
               <a:rPr lang="zh-TW" altLang="en-US" smtClean="0"/>
-              <a:t>2022/4/24</a:t>
+              <a:t>2022/4/29</a:t>
             </a:fld>
             <a:endParaRPr lang="zh-TW" altLang="en-US"/>
           </a:p>
@@ -3836,7 +3838,7 @@
           <a:p>
             <a:fld id="{6BEC47B9-7618-490E-9D9C-1CAEF400DDF2}" type="datetime1">
               <a:rPr lang="zh-TW" altLang="en-US" smtClean="0"/>
-              <a:t>2022/4/24</a:t>
+              <a:t>2022/4/29</a:t>
             </a:fld>
             <a:endParaRPr lang="zh-TW" altLang="en-US"/>
           </a:p>
@@ -4049,7 +4051,7 @@
           <a:p>
             <a:fld id="{FC308D0F-3EFC-4DEC-A676-0DBC7A663400}" type="datetime1">
               <a:rPr lang="zh-TW" altLang="en-US" smtClean="0"/>
-              <a:t>2022/4/24</a:t>
+              <a:t>2022/4/29</a:t>
             </a:fld>
             <a:endParaRPr lang="zh-TW" altLang="en-US"/>
           </a:p>
@@ -6486,7 +6488,7 @@
           <p:cNvPr id="5" name="內容版面配置區 4">
             <a:extLst>
               <a:ext uri="{FF2B5EF4-FFF2-40B4-BE49-F238E27FC236}">
-                <a16:creationId xmlns:a16="http://schemas.microsoft.com/office/drawing/2014/main" id="{67BA9D5C-9E35-48A2-BCDA-59612874ADB4}"/>
+                <a16:creationId xmlns:a16="http://schemas.microsoft.com/office/drawing/2014/main" id="{6D47BB14-8D48-4FA4-86B3-84085E9C8CB7}"/>
               </a:ext>
             </a:extLst>
           </p:cNvPr>
@@ -6505,8 +6507,8 @@
         </p:blipFill>
         <p:spPr>
           <a:xfrm>
-            <a:off x="838200" y="3133566"/>
-            <a:ext cx="10515600" cy="1173480"/>
+            <a:off x="838200" y="3149266"/>
+            <a:ext cx="10515600" cy="1142080"/>
           </a:xfrm>
           <a:prstGeom prst="rect">
             <a:avLst/>
@@ -6518,7 +6520,7 @@
           <p:cNvPr id="3" name="標題 2">
             <a:extLst>
               <a:ext uri="{FF2B5EF4-FFF2-40B4-BE49-F238E27FC236}">
-                <a16:creationId xmlns:a16="http://schemas.microsoft.com/office/drawing/2014/main" id="{2D596D61-BA63-4935-8850-B2DDB5320A75}"/>
+                <a16:creationId xmlns:a16="http://schemas.microsoft.com/office/drawing/2014/main" id="{6147A46B-62C6-4290-9FF3-E70031F19672}"/>
               </a:ext>
             </a:extLst>
           </p:cNvPr>
@@ -6536,7 +6538,7 @@
           <a:p>
             <a:r>
               <a:rPr lang="en-US" altLang="zh-TW" dirty="0"/>
-              <a:t>2022/04/08 ~ 2022/04/15</a:t>
+              <a:t>2022/04/15 ~ 2022/04/22</a:t>
             </a:r>
             <a:endParaRPr lang="zh-TW" altLang="en-US" dirty="0"/>
           </a:p>
@@ -6547,7 +6549,7 @@
           <p:cNvPr id="4" name="投影片編號版面配置區 3">
             <a:extLst>
               <a:ext uri="{FF2B5EF4-FFF2-40B4-BE49-F238E27FC236}">
-                <a16:creationId xmlns:a16="http://schemas.microsoft.com/office/drawing/2014/main" id="{BBD911C3-99AB-4F79-825D-E9C61926F4CB}"/>
+                <a16:creationId xmlns:a16="http://schemas.microsoft.com/office/drawing/2014/main" id="{18D6E14B-0DB0-41D5-923E-84B085EECF13}"/>
               </a:ext>
             </a:extLst>
           </p:cNvPr>
@@ -6574,7 +6576,7 @@
     </p:spTree>
     <p:extLst>
       <p:ext uri="{BB962C8B-B14F-4D97-AF65-F5344CB8AC3E}">
-        <p14:creationId xmlns:p14="http://schemas.microsoft.com/office/powerpoint/2010/main" val="3810573088"/>
+        <p14:creationId xmlns:p14="http://schemas.microsoft.com/office/powerpoint/2010/main" val="1720080269"/>
       </p:ext>
     </p:extLst>
   </p:cSld>
@@ -6601,6 +6603,126 @@
           <a:chExt cx="0" cy="0"/>
         </a:xfrm>
       </p:grpSpPr>
+      <p:pic>
+        <p:nvPicPr>
+          <p:cNvPr id="5" name="內容版面配置區 4">
+            <a:extLst>
+              <a:ext uri="{FF2B5EF4-FFF2-40B4-BE49-F238E27FC236}">
+                <a16:creationId xmlns:a16="http://schemas.microsoft.com/office/drawing/2014/main" id="{67BA9D5C-9E35-48A2-BCDA-59612874ADB4}"/>
+              </a:ext>
+            </a:extLst>
+          </p:cNvPr>
+          <p:cNvPicPr>
+            <a:picLocks noGrp="1" noChangeAspect="1"/>
+          </p:cNvPicPr>
+          <p:nvPr>
+            <p:ph idx="1"/>
+          </p:nvPr>
+        </p:nvPicPr>
+        <p:blipFill>
+          <a:blip r:embed="rId2"/>
+          <a:stretch>
+            <a:fillRect/>
+          </a:stretch>
+        </p:blipFill>
+        <p:spPr>
+          <a:xfrm>
+            <a:off x="838200" y="3133566"/>
+            <a:ext cx="10515600" cy="1173480"/>
+          </a:xfrm>
+          <a:prstGeom prst="rect">
+            <a:avLst/>
+          </a:prstGeom>
+        </p:spPr>
+      </p:pic>
+      <p:sp>
+        <p:nvSpPr>
+          <p:cNvPr id="3" name="標題 2">
+            <a:extLst>
+              <a:ext uri="{FF2B5EF4-FFF2-40B4-BE49-F238E27FC236}">
+                <a16:creationId xmlns:a16="http://schemas.microsoft.com/office/drawing/2014/main" id="{2D596D61-BA63-4935-8850-B2DDB5320A75}"/>
+              </a:ext>
+            </a:extLst>
+          </p:cNvPr>
+          <p:cNvSpPr>
+            <a:spLocks noGrp="1"/>
+          </p:cNvSpPr>
+          <p:nvPr>
+            <p:ph type="title"/>
+          </p:nvPr>
+        </p:nvSpPr>
+        <p:spPr/>
+        <p:txBody>
+          <a:bodyPr/>
+          <a:lstStyle/>
+          <a:p>
+            <a:r>
+              <a:rPr lang="en-US" altLang="zh-TW" dirty="0"/>
+              <a:t>2022/04/08 ~ 2022/04/15</a:t>
+            </a:r>
+            <a:endParaRPr lang="zh-TW" altLang="en-US" dirty="0"/>
+          </a:p>
+        </p:txBody>
+      </p:sp>
+      <p:sp>
+        <p:nvSpPr>
+          <p:cNvPr id="4" name="投影片編號版面配置區 3">
+            <a:extLst>
+              <a:ext uri="{FF2B5EF4-FFF2-40B4-BE49-F238E27FC236}">
+                <a16:creationId xmlns:a16="http://schemas.microsoft.com/office/drawing/2014/main" id="{BBD911C3-99AB-4F79-825D-E9C61926F4CB}"/>
+              </a:ext>
+            </a:extLst>
+          </p:cNvPr>
+          <p:cNvSpPr>
+            <a:spLocks noGrp="1"/>
+          </p:cNvSpPr>
+          <p:nvPr>
+            <p:ph type="sldNum" sz="quarter" idx="12"/>
+          </p:nvPr>
+        </p:nvSpPr>
+        <p:spPr/>
+        <p:txBody>
+          <a:bodyPr/>
+          <a:lstStyle/>
+          <a:p>
+            <a:fld id="{90F9E983-480B-48C5-9E0F-D21C0DFBB5C0}" type="slidenum">
+              <a:rPr lang="zh-TW" altLang="en-US" smtClean="0"/>
+              <a:t>17</a:t>
+            </a:fld>
+            <a:endParaRPr lang="zh-TW" altLang="en-US"/>
+          </a:p>
+        </p:txBody>
+      </p:sp>
+    </p:spTree>
+    <p:extLst>
+      <p:ext uri="{BB962C8B-B14F-4D97-AF65-F5344CB8AC3E}">
+        <p14:creationId xmlns:p14="http://schemas.microsoft.com/office/powerpoint/2010/main" val="3810573088"/>
+      </p:ext>
+    </p:extLst>
+  </p:cSld>
+  <p:clrMapOvr>
+    <a:masterClrMapping/>
+  </p:clrMapOvr>
+</p:sld>
+</file>
+
+<file path=ppt/slides/slide18.xml><?xml version="1.0" encoding="utf-8"?>
+<p:sld xmlns:a="http://schemas.openxmlformats.org/drawingml/2006/main" xmlns:r="http://schemas.openxmlformats.org/officeDocument/2006/relationships" xmlns:p="http://schemas.openxmlformats.org/presentationml/2006/main">
+  <p:cSld>
+    <p:spTree>
+      <p:nvGrpSpPr>
+        <p:cNvPr id="1" name=""/>
+        <p:cNvGrpSpPr/>
+        <p:nvPr/>
+      </p:nvGrpSpPr>
+      <p:grpSpPr>
+        <a:xfrm>
+          <a:off x="0" y="0"/>
+          <a:ext cx="0" cy="0"/>
+          <a:chOff x="0" y="0"/>
+          <a:chExt cx="0" cy="0"/>
+        </a:xfrm>
+      </p:grpSpPr>
       <p:sp>
         <p:nvSpPr>
           <p:cNvPr id="3" name="標題 2">
@@ -6653,7 +6775,7 @@
           <a:p>
             <a:fld id="{90F9E983-480B-48C5-9E0F-D21C0DFBB5C0}" type="slidenum">
               <a:rPr lang="zh-TW" altLang="en-US" smtClean="0"/>
-              <a:t>17</a:t>
+              <a:t>18</a:t>
             </a:fld>
             <a:endParaRPr lang="zh-TW" altLang="en-US"/>
           </a:p>
@@ -6702,7 +6824,7 @@
 </p:sld>
 </file>
 
-<file path=ppt/slides/slide18.xml><?xml version="1.0" encoding="utf-8"?>
+<file path=ppt/slides/slide19.xml><?xml version="1.0" encoding="utf-8"?>
 <p:sld xmlns:a="http://schemas.openxmlformats.org/drawingml/2006/main" xmlns:r="http://schemas.openxmlformats.org/officeDocument/2006/relationships" xmlns:p="http://schemas.openxmlformats.org/presentationml/2006/main">
   <p:cSld>
     <p:spTree>
@@ -6771,7 +6893,7 @@
           <a:p>
             <a:fld id="{90F9E983-480B-48C5-9E0F-D21C0DFBB5C0}" type="slidenum">
               <a:rPr lang="zh-TW" altLang="en-US" smtClean="0"/>
-              <a:t>18</a:t>
+              <a:t>19</a:t>
             </a:fld>
             <a:endParaRPr lang="zh-TW" altLang="en-US"/>
           </a:p>

</xml_diff>

<commit_message>
2022/05/13 ~ 2022/05/20 1. 補 - GIC MASK 暫存器 2. 補 - GIC pending 暫存器 3. 補 - GIC 中斷暫存器
</commit_message>
<xml_diff>
--- a/DevelopmentLog/Pingpong.pptx
+++ b/DevelopmentLog/Pingpong.pptx
@@ -872,6 +872,61 @@
       </p:grpSpPr>
       <p:sp>
         <p:nvSpPr>
+          <p:cNvPr id="2" name="備忘稿版面配置區 1">
+            <a:extLst>
+              <a:ext uri="{FF2B5EF4-FFF2-40B4-BE49-F238E27FC236}">
+                <a16:creationId xmlns:a16="http://schemas.microsoft.com/office/drawing/2014/main" id="{B20C3A9F-2D6F-488D-9DB9-3C8F7ADD7CF4}"/>
+              </a:ext>
+            </a:extLst>
+          </p:cNvPr>
+          <p:cNvSpPr>
+            <a:spLocks noGrp="1"/>
+          </p:cNvSpPr>
+          <p:nvPr>
+            <p:ph type="body" idx="1"/>
+          </p:nvPr>
+        </p:nvSpPr>
+        <p:spPr/>
+        <p:txBody>
+          <a:bodyPr/>
+          <a:lstStyle/>
+          <a:p>
+            <a:endParaRPr lang="zh-TW" altLang="en-US" dirty="0"/>
+          </a:p>
+        </p:txBody>
+      </p:sp>
+    </p:spTree>
+    <p:extLst>
+      <p:ext uri="{BB962C8B-B14F-4D97-AF65-F5344CB8AC3E}">
+        <p14:creationId xmlns:p14="http://schemas.microsoft.com/office/powerpoint/2010/main" val="3291142940"/>
+      </p:ext>
+    </p:extLst>
+  </p:cSld>
+  <p:clrMapOvr>
+    <a:masterClrMapping/>
+  </p:clrMapOvr>
+</p:notes>
+</file>
+
+<file path=ppt/notesSlides/notesSlide11.xml><?xml version="1.0" encoding="utf-8"?>
+<p:notes xmlns:a="http://schemas.openxmlformats.org/drawingml/2006/main" xmlns:r="http://schemas.openxmlformats.org/officeDocument/2006/relationships" xmlns:p="http://schemas.openxmlformats.org/presentationml/2006/main">
+  <p:cSld>
+    <p:spTree>
+      <p:nvGrpSpPr>
+        <p:cNvPr id="1" name=""/>
+        <p:cNvGrpSpPr/>
+        <p:nvPr/>
+      </p:nvGrpSpPr>
+      <p:grpSpPr>
+        <a:xfrm>
+          <a:off x="0" y="0"/>
+          <a:ext cx="0" cy="0"/>
+          <a:chOff x="0" y="0"/>
+          <a:chExt cx="0" cy="0"/>
+        </a:xfrm>
+      </p:grpSpPr>
+      <p:sp>
+        <p:nvSpPr>
           <p:cNvPr id="2" name="投影片影像版面配置區 1"/>
           <p:cNvSpPr>
             <a:spLocks noGrp="1" noRot="1" noChangeAspect="1"/>
@@ -937,7 +992,7 @@
 </p:notes>
 </file>
 
-<file path=ppt/notesSlides/notesSlide11.xml><?xml version="1.0" encoding="utf-8"?>
+<file path=ppt/notesSlides/notesSlide12.xml><?xml version="1.0" encoding="utf-8"?>
 <p:notes xmlns:a="http://schemas.openxmlformats.org/drawingml/2006/main" xmlns:r="http://schemas.openxmlformats.org/officeDocument/2006/relationships" xmlns:p="http://schemas.openxmlformats.org/presentationml/2006/main">
   <p:cSld>
     <p:spTree>
@@ -967,7 +1022,7 @@
 </p:notes>
 </file>
 
-<file path=ppt/notesSlides/notesSlide12.xml><?xml version="1.0" encoding="utf-8"?>
+<file path=ppt/notesSlides/notesSlide13.xml><?xml version="1.0" encoding="utf-8"?>
 <p:notes xmlns:a="http://schemas.openxmlformats.org/drawingml/2006/main" xmlns:r="http://schemas.openxmlformats.org/officeDocument/2006/relationships" xmlns:p="http://schemas.openxmlformats.org/presentationml/2006/main">
   <p:cSld>
     <p:spTree>
@@ -1051,7 +1106,7 @@
 </p:notes>
 </file>
 
-<file path=ppt/notesSlides/notesSlide13.xml><?xml version="1.0" encoding="utf-8"?>
+<file path=ppt/notesSlides/notesSlide14.xml><?xml version="1.0" encoding="utf-8"?>
 <p:notes xmlns:a="http://schemas.openxmlformats.org/drawingml/2006/main" xmlns:r="http://schemas.openxmlformats.org/officeDocument/2006/relationships" xmlns:p="http://schemas.openxmlformats.org/presentationml/2006/main">
   <p:cSld>
     <p:spTree>
@@ -1081,7 +1136,7 @@
 </p:notes>
 </file>
 
-<file path=ppt/notesSlides/notesSlide14.xml><?xml version="1.0" encoding="utf-8"?>
+<file path=ppt/notesSlides/notesSlide15.xml><?xml version="1.0" encoding="utf-8"?>
 <p:notes xmlns:a="http://schemas.openxmlformats.org/drawingml/2006/main" xmlns:r="http://schemas.openxmlformats.org/officeDocument/2006/relationships" xmlns:p="http://schemas.openxmlformats.org/presentationml/2006/main">
   <p:cSld>
     <p:spTree>
@@ -1111,7 +1166,7 @@
 </p:notes>
 </file>
 
-<file path=ppt/notesSlides/notesSlide15.xml><?xml version="1.0" encoding="utf-8"?>
+<file path=ppt/notesSlides/notesSlide16.xml><?xml version="1.0" encoding="utf-8"?>
 <p:notes xmlns:a="http://schemas.openxmlformats.org/drawingml/2006/main" xmlns:r="http://schemas.openxmlformats.org/officeDocument/2006/relationships" xmlns:p="http://schemas.openxmlformats.org/presentationml/2006/main">
   <p:cSld>
     <p:spTree>
@@ -1304,13 +1359,19 @@
       </p:grpSpPr>
       <p:sp>
         <p:nvSpPr>
-          <p:cNvPr id="2" name="備忘稿版面配置區 1">
-            <a:extLst>
-              <a:ext uri="{FF2B5EF4-FFF2-40B4-BE49-F238E27FC236}">
-                <a16:creationId xmlns:a16="http://schemas.microsoft.com/office/drawing/2014/main" id="{B20C3A9F-2D6F-488D-9DB9-3C8F7ADD7CF4}"/>
-              </a:ext>
-            </a:extLst>
-          </p:cNvPr>
+          <p:cNvPr id="2" name="投影片影像版面配置區 1"/>
+          <p:cNvSpPr>
+            <a:spLocks noGrp="1" noRot="1" noChangeAspect="1"/>
+          </p:cNvSpPr>
+          <p:nvPr>
+            <p:ph type="sldImg"/>
+          </p:nvPr>
+        </p:nvSpPr>
+        <p:spPr/>
+      </p:sp>
+      <p:sp>
+        <p:nvSpPr>
+          <p:cNvPr id="3" name="備忘稿版面配置區 2"/>
           <p:cNvSpPr>
             <a:spLocks noGrp="1"/>
           </p:cNvSpPr>
@@ -1327,10 +1388,33 @@
           </a:p>
         </p:txBody>
       </p:sp>
+      <p:sp>
+        <p:nvSpPr>
+          <p:cNvPr id="4" name="投影片編號版面配置區 3"/>
+          <p:cNvSpPr>
+            <a:spLocks noGrp="1"/>
+          </p:cNvSpPr>
+          <p:nvPr>
+            <p:ph type="sldNum" sz="quarter" idx="5"/>
+          </p:nvPr>
+        </p:nvSpPr>
+        <p:spPr/>
+        <p:txBody>
+          <a:bodyPr/>
+          <a:lstStyle/>
+          <a:p>
+            <a:fld id="{EF8A6B0B-A5FB-4629-B823-69B1A9EB3A43}" type="slidenum">
+              <a:rPr lang="zh-TW" altLang="en-US" smtClean="0"/>
+              <a:t>12</a:t>
+            </a:fld>
+            <a:endParaRPr lang="zh-TW" altLang="en-US"/>
+          </a:p>
+        </p:txBody>
+      </p:sp>
     </p:spTree>
     <p:extLst>
       <p:ext uri="{BB962C8B-B14F-4D97-AF65-F5344CB8AC3E}">
-        <p14:creationId xmlns:p14="http://schemas.microsoft.com/office/powerpoint/2010/main" val="4078308320"/>
+        <p14:creationId xmlns:p14="http://schemas.microsoft.com/office/powerpoint/2010/main" val="1667887174"/>
       </p:ext>
     </p:extLst>
   </p:cSld>
@@ -1359,19 +1443,13 @@
       </p:grpSpPr>
       <p:sp>
         <p:nvSpPr>
-          <p:cNvPr id="2" name="投影片影像版面配置區 1"/>
-          <p:cNvSpPr>
-            <a:spLocks noGrp="1" noRot="1" noChangeAspect="1"/>
-          </p:cNvSpPr>
-          <p:nvPr>
-            <p:ph type="sldImg"/>
-          </p:nvPr>
-        </p:nvSpPr>
-        <p:spPr/>
-      </p:sp>
-      <p:sp>
-        <p:nvSpPr>
-          <p:cNvPr id="3" name="備忘稿版面配置區 2"/>
+          <p:cNvPr id="2" name="備忘稿版面配置區 1">
+            <a:extLst>
+              <a:ext uri="{FF2B5EF4-FFF2-40B4-BE49-F238E27FC236}">
+                <a16:creationId xmlns:a16="http://schemas.microsoft.com/office/drawing/2014/main" id="{B20C3A9F-2D6F-488D-9DB9-3C8F7ADD7CF4}"/>
+              </a:ext>
+            </a:extLst>
+          </p:cNvPr>
           <p:cNvSpPr>
             <a:spLocks noGrp="1"/>
           </p:cNvSpPr>
@@ -1388,33 +1466,10 @@
           </a:p>
         </p:txBody>
       </p:sp>
-      <p:sp>
-        <p:nvSpPr>
-          <p:cNvPr id="4" name="投影片編號版面配置區 3"/>
-          <p:cNvSpPr>
-            <a:spLocks noGrp="1"/>
-          </p:cNvSpPr>
-          <p:nvPr>
-            <p:ph type="sldNum" sz="quarter" idx="5"/>
-          </p:nvPr>
-        </p:nvSpPr>
-        <p:spPr/>
-        <p:txBody>
-          <a:bodyPr/>
-          <a:lstStyle/>
-          <a:p>
-            <a:fld id="{EF8A6B0B-A5FB-4629-B823-69B1A9EB3A43}" type="slidenum">
-              <a:rPr lang="zh-TW" altLang="en-US" smtClean="0"/>
-              <a:t>21</a:t>
-            </a:fld>
-            <a:endParaRPr lang="zh-TW" altLang="en-US"/>
-          </a:p>
-        </p:txBody>
-      </p:sp>
     </p:spTree>
     <p:extLst>
       <p:ext uri="{BB962C8B-B14F-4D97-AF65-F5344CB8AC3E}">
-        <p14:creationId xmlns:p14="http://schemas.microsoft.com/office/powerpoint/2010/main" val="785808151"/>
+        <p14:creationId xmlns:p14="http://schemas.microsoft.com/office/powerpoint/2010/main" val="4078308320"/>
       </p:ext>
     </p:extLst>
   </p:cSld>
@@ -1443,13 +1498,19 @@
       </p:grpSpPr>
       <p:sp>
         <p:nvSpPr>
-          <p:cNvPr id="2" name="備忘稿版面配置區 1">
-            <a:extLst>
-              <a:ext uri="{FF2B5EF4-FFF2-40B4-BE49-F238E27FC236}">
-                <a16:creationId xmlns:a16="http://schemas.microsoft.com/office/drawing/2014/main" id="{B20C3A9F-2D6F-488D-9DB9-3C8F7ADD7CF4}"/>
-              </a:ext>
-            </a:extLst>
-          </p:cNvPr>
+          <p:cNvPr id="2" name="投影片影像版面配置區 1"/>
+          <p:cNvSpPr>
+            <a:spLocks noGrp="1" noRot="1" noChangeAspect="1"/>
+          </p:cNvSpPr>
+          <p:nvPr>
+            <p:ph type="sldImg"/>
+          </p:nvPr>
+        </p:nvSpPr>
+        <p:spPr/>
+      </p:sp>
+      <p:sp>
+        <p:nvSpPr>
+          <p:cNvPr id="3" name="備忘稿版面配置區 2"/>
           <p:cNvSpPr>
             <a:spLocks noGrp="1"/>
           </p:cNvSpPr>
@@ -1466,10 +1527,33 @@
           </a:p>
         </p:txBody>
       </p:sp>
+      <p:sp>
+        <p:nvSpPr>
+          <p:cNvPr id="4" name="投影片編號版面配置區 3"/>
+          <p:cNvSpPr>
+            <a:spLocks noGrp="1"/>
+          </p:cNvSpPr>
+          <p:nvPr>
+            <p:ph type="sldNum" sz="quarter" idx="5"/>
+          </p:nvPr>
+        </p:nvSpPr>
+        <p:spPr/>
+        <p:txBody>
+          <a:bodyPr/>
+          <a:lstStyle/>
+          <a:p>
+            <a:fld id="{EF8A6B0B-A5FB-4629-B823-69B1A9EB3A43}" type="slidenum">
+              <a:rPr lang="zh-TW" altLang="en-US" smtClean="0"/>
+              <a:t>21</a:t>
+            </a:fld>
+            <a:endParaRPr lang="zh-TW" altLang="en-US"/>
+          </a:p>
+        </p:txBody>
+      </p:sp>
     </p:spTree>
     <p:extLst>
       <p:ext uri="{BB962C8B-B14F-4D97-AF65-F5344CB8AC3E}">
-        <p14:creationId xmlns:p14="http://schemas.microsoft.com/office/powerpoint/2010/main" val="3198581036"/>
+        <p14:creationId xmlns:p14="http://schemas.microsoft.com/office/powerpoint/2010/main" val="785808151"/>
       </p:ext>
     </p:extLst>
   </p:cSld>
@@ -1498,19 +1582,13 @@
       </p:grpSpPr>
       <p:sp>
         <p:nvSpPr>
-          <p:cNvPr id="2" name="投影片影像版面配置區 1"/>
-          <p:cNvSpPr>
-            <a:spLocks noGrp="1" noRot="1" noChangeAspect="1"/>
-          </p:cNvSpPr>
-          <p:nvPr>
-            <p:ph type="sldImg"/>
-          </p:nvPr>
-        </p:nvSpPr>
-        <p:spPr/>
-      </p:sp>
-      <p:sp>
-        <p:nvSpPr>
-          <p:cNvPr id="3" name="備忘稿版面配置區 2"/>
+          <p:cNvPr id="2" name="備忘稿版面配置區 1">
+            <a:extLst>
+              <a:ext uri="{FF2B5EF4-FFF2-40B4-BE49-F238E27FC236}">
+                <a16:creationId xmlns:a16="http://schemas.microsoft.com/office/drawing/2014/main" id="{B20C3A9F-2D6F-488D-9DB9-3C8F7ADD7CF4}"/>
+              </a:ext>
+            </a:extLst>
+          </p:cNvPr>
           <p:cNvSpPr>
             <a:spLocks noGrp="1"/>
           </p:cNvSpPr>
@@ -1527,33 +1605,10 @@
           </a:p>
         </p:txBody>
       </p:sp>
-      <p:sp>
-        <p:nvSpPr>
-          <p:cNvPr id="4" name="投影片編號版面配置區 3"/>
-          <p:cNvSpPr>
-            <a:spLocks noGrp="1"/>
-          </p:cNvSpPr>
-          <p:nvPr>
-            <p:ph type="sldNum" sz="quarter" idx="5"/>
-          </p:nvPr>
-        </p:nvSpPr>
-        <p:spPr/>
-        <p:txBody>
-          <a:bodyPr/>
-          <a:lstStyle/>
-          <a:p>
-            <a:fld id="{EF8A6B0B-A5FB-4629-B823-69B1A9EB3A43}" type="slidenum">
-              <a:rPr lang="zh-TW" altLang="en-US" smtClean="0"/>
-              <a:t>23</a:t>
-            </a:fld>
-            <a:endParaRPr lang="zh-TW" altLang="en-US"/>
-          </a:p>
-        </p:txBody>
-      </p:sp>
     </p:spTree>
     <p:extLst>
       <p:ext uri="{BB962C8B-B14F-4D97-AF65-F5344CB8AC3E}">
-        <p14:creationId xmlns:p14="http://schemas.microsoft.com/office/powerpoint/2010/main" val="2746108643"/>
+        <p14:creationId xmlns:p14="http://schemas.microsoft.com/office/powerpoint/2010/main" val="3198581036"/>
       </p:ext>
     </p:extLst>
   </p:cSld>
@@ -1582,13 +1637,19 @@
       </p:grpSpPr>
       <p:sp>
         <p:nvSpPr>
-          <p:cNvPr id="2" name="備忘稿版面配置區 1">
-            <a:extLst>
-              <a:ext uri="{FF2B5EF4-FFF2-40B4-BE49-F238E27FC236}">
-                <a16:creationId xmlns:a16="http://schemas.microsoft.com/office/drawing/2014/main" id="{B20C3A9F-2D6F-488D-9DB9-3C8F7ADD7CF4}"/>
-              </a:ext>
-            </a:extLst>
-          </p:cNvPr>
+          <p:cNvPr id="2" name="投影片影像版面配置區 1"/>
+          <p:cNvSpPr>
+            <a:spLocks noGrp="1" noRot="1" noChangeAspect="1"/>
+          </p:cNvSpPr>
+          <p:nvPr>
+            <p:ph type="sldImg"/>
+          </p:nvPr>
+        </p:nvSpPr>
+        <p:spPr/>
+      </p:sp>
+      <p:sp>
+        <p:nvSpPr>
+          <p:cNvPr id="3" name="備忘稿版面配置區 2"/>
           <p:cNvSpPr>
             <a:spLocks noGrp="1"/>
           </p:cNvSpPr>
@@ -1605,10 +1666,33 @@
           </a:p>
         </p:txBody>
       </p:sp>
+      <p:sp>
+        <p:nvSpPr>
+          <p:cNvPr id="4" name="投影片編號版面配置區 3"/>
+          <p:cNvSpPr>
+            <a:spLocks noGrp="1"/>
+          </p:cNvSpPr>
+          <p:nvPr>
+            <p:ph type="sldNum" sz="quarter" idx="5"/>
+          </p:nvPr>
+        </p:nvSpPr>
+        <p:spPr/>
+        <p:txBody>
+          <a:bodyPr/>
+          <a:lstStyle/>
+          <a:p>
+            <a:fld id="{EF8A6B0B-A5FB-4629-B823-69B1A9EB3A43}" type="slidenum">
+              <a:rPr lang="zh-TW" altLang="en-US" smtClean="0"/>
+              <a:t>23</a:t>
+            </a:fld>
+            <a:endParaRPr lang="zh-TW" altLang="en-US"/>
+          </a:p>
+        </p:txBody>
+      </p:sp>
     </p:spTree>
     <p:extLst>
       <p:ext uri="{BB962C8B-B14F-4D97-AF65-F5344CB8AC3E}">
-        <p14:creationId xmlns:p14="http://schemas.microsoft.com/office/powerpoint/2010/main" val="3291142940"/>
+        <p14:creationId xmlns:p14="http://schemas.microsoft.com/office/powerpoint/2010/main" val="2746108643"/>
       </p:ext>
     </p:extLst>
   </p:cSld>
@@ -6081,14 +6165,14 @@
           <p:nvPr/>
         </p:nvPicPr>
         <p:blipFill>
-          <a:blip r:embed="rId2"/>
+          <a:blip r:embed="rId3"/>
           <a:stretch>
             <a:fillRect/>
           </a:stretch>
         </p:blipFill>
         <p:spPr>
           <a:xfrm>
-            <a:off x="3281994" y="1660497"/>
+            <a:off x="5905121" y="1660497"/>
             <a:ext cx="5212178" cy="4653433"/>
           </a:xfrm>
           <a:prstGeom prst="rect">
@@ -6110,7 +6194,7 @@
         </p:nvSpPr>
         <p:spPr>
           <a:xfrm>
-            <a:off x="3281993" y="3221976"/>
+            <a:off x="5905120" y="3221976"/>
             <a:ext cx="4088625" cy="434109"/>
           </a:xfrm>
           <a:prstGeom prst="rect">
@@ -6162,7 +6246,7 @@
         </p:nvSpPr>
         <p:spPr>
           <a:xfrm>
-            <a:off x="2927857" y="1475831"/>
+            <a:off x="5550984" y="1475831"/>
             <a:ext cx="6336286" cy="369332"/>
           </a:xfrm>
           <a:prstGeom prst="rect">
@@ -6264,6 +6348,96 @@
           </a:p>
         </p:txBody>
       </p:sp>
+      <p:pic>
+        <p:nvPicPr>
+          <p:cNvPr id="10" name="圖片 9">
+            <a:extLst>
+              <a:ext uri="{FF2B5EF4-FFF2-40B4-BE49-F238E27FC236}">
+                <a16:creationId xmlns:a16="http://schemas.microsoft.com/office/drawing/2014/main" id="{D02C5290-1778-4A43-88F1-705C5A37BCFD}"/>
+              </a:ext>
+            </a:extLst>
+          </p:cNvPr>
+          <p:cNvPicPr>
+            <a:picLocks noChangeAspect="1"/>
+          </p:cNvPicPr>
+          <p:nvPr/>
+        </p:nvPicPr>
+        <p:blipFill>
+          <a:blip r:embed="rId4"/>
+          <a:stretch>
+            <a:fillRect/>
+          </a:stretch>
+        </p:blipFill>
+        <p:spPr>
+          <a:xfrm>
+            <a:off x="374063" y="1702889"/>
+            <a:ext cx="5313664" cy="1953196"/>
+          </a:xfrm>
+          <a:prstGeom prst="rect">
+            <a:avLst/>
+          </a:prstGeom>
+        </p:spPr>
+      </p:pic>
+      <p:pic>
+        <p:nvPicPr>
+          <p:cNvPr id="11" name="圖片 10">
+            <a:extLst>
+              <a:ext uri="{FF2B5EF4-FFF2-40B4-BE49-F238E27FC236}">
+                <a16:creationId xmlns:a16="http://schemas.microsoft.com/office/drawing/2014/main" id="{79B49F7C-19B2-4127-B1E7-667EC0A8E3D3}"/>
+              </a:ext>
+            </a:extLst>
+          </p:cNvPr>
+          <p:cNvPicPr>
+            <a:picLocks noChangeAspect="1"/>
+          </p:cNvPicPr>
+          <p:nvPr/>
+        </p:nvPicPr>
+        <p:blipFill>
+          <a:blip r:embed="rId5"/>
+          <a:stretch>
+            <a:fillRect/>
+          </a:stretch>
+        </p:blipFill>
+        <p:spPr>
+          <a:xfrm>
+            <a:off x="374063" y="3799451"/>
+            <a:ext cx="2499497" cy="2183510"/>
+          </a:xfrm>
+          <a:prstGeom prst="rect">
+            <a:avLst/>
+          </a:prstGeom>
+        </p:spPr>
+      </p:pic>
+      <p:pic>
+        <p:nvPicPr>
+          <p:cNvPr id="12" name="圖片 11">
+            <a:extLst>
+              <a:ext uri="{FF2B5EF4-FFF2-40B4-BE49-F238E27FC236}">
+                <a16:creationId xmlns:a16="http://schemas.microsoft.com/office/drawing/2014/main" id="{62A2DEC4-031E-4F37-83EC-001125235792}"/>
+              </a:ext>
+            </a:extLst>
+          </p:cNvPr>
+          <p:cNvPicPr>
+            <a:picLocks noChangeAspect="1"/>
+          </p:cNvPicPr>
+          <p:nvPr/>
+        </p:nvPicPr>
+        <p:blipFill>
+          <a:blip r:embed="rId6"/>
+          <a:stretch>
+            <a:fillRect/>
+          </a:stretch>
+        </p:blipFill>
+        <p:spPr>
+          <a:xfrm>
+            <a:off x="3281578" y="3799450"/>
+            <a:ext cx="2024903" cy="2307793"/>
+          </a:xfrm>
+          <a:prstGeom prst="rect">
+            <a:avLst/>
+          </a:prstGeom>
+        </p:spPr>
+      </p:pic>
     </p:spTree>
     <p:extLst>
       <p:ext uri="{BB962C8B-B14F-4D97-AF65-F5344CB8AC3E}">
@@ -6360,12 +6534,62 @@
           </a:p>
         </p:txBody>
       </p:sp>
+      <p:sp>
+        <p:nvSpPr>
+          <p:cNvPr id="9" name="文字方塊 8">
+            <a:extLst>
+              <a:ext uri="{FF2B5EF4-FFF2-40B4-BE49-F238E27FC236}">
+                <a16:creationId xmlns:a16="http://schemas.microsoft.com/office/drawing/2014/main" id="{370A3087-8A21-4252-9E23-2AE5AD8CF0BD}"/>
+              </a:ext>
+            </a:extLst>
+          </p:cNvPr>
+          <p:cNvSpPr txBox="1"/>
+          <p:nvPr/>
+        </p:nvSpPr>
+        <p:spPr>
+          <a:xfrm>
+            <a:off x="838198" y="1190191"/>
+            <a:ext cx="2330397" cy="369332"/>
+          </a:xfrm>
+          <a:prstGeom prst="rect">
+            <a:avLst/>
+          </a:prstGeom>
+          <a:noFill/>
+        </p:spPr>
+        <p:txBody>
+          <a:bodyPr wrap="square">
+            <a:spAutoFit/>
+          </a:bodyPr>
+          <a:lstStyle/>
+          <a:p>
+            <a:pPr marL="285750" indent="-285750">
+              <a:buFont typeface="Wingdings" panose="05000000000000000000" pitchFamily="2" charset="2"/>
+              <a:buChar char="n"/>
+            </a:pPr>
+            <a:r>
+              <a:rPr lang="en-US" altLang="zh-TW" dirty="0"/>
+              <a:t>GIC MASK</a:t>
+            </a:r>
+            <a:r>
+              <a:rPr lang="zh-TW" altLang="en-US" dirty="0">
+                <a:latin typeface="標楷體" panose="03000509000000000000" pitchFamily="65" charset="-120"/>
+                <a:ea typeface="標楷體" panose="03000509000000000000" pitchFamily="65" charset="-120"/>
+              </a:rPr>
+              <a:t>暫存器</a:t>
+            </a:r>
+            <a:endParaRPr lang="en-US" altLang="zh-TW" dirty="0">
+              <a:latin typeface="標楷體" panose="03000509000000000000" pitchFamily="65" charset="-120"/>
+              <a:ea typeface="標楷體" panose="03000509000000000000" pitchFamily="65" charset="-120"/>
+            </a:endParaRPr>
+          </a:p>
+        </p:txBody>
+      </p:sp>
       <p:pic>
         <p:nvPicPr>
-          <p:cNvPr id="6" name="圖片 5">
-            <a:extLst>
-              <a:ext uri="{FF2B5EF4-FFF2-40B4-BE49-F238E27FC236}">
-                <a16:creationId xmlns:a16="http://schemas.microsoft.com/office/drawing/2014/main" id="{7B798361-FCCB-463F-922D-A229511F081E}"/>
+          <p:cNvPr id="5" name="圖片 4">
+            <a:extLst>
+              <a:ext uri="{FF2B5EF4-FFF2-40B4-BE49-F238E27FC236}">
+                <a16:creationId xmlns:a16="http://schemas.microsoft.com/office/drawing/2014/main" id="{423109A6-1201-4371-9501-8D55E6796C3C}"/>
               </a:ext>
             </a:extLst>
           </p:cNvPr>
@@ -6382,20 +6606,153 @@
         </p:blipFill>
         <p:spPr>
           <a:xfrm>
-            <a:off x="593935" y="2560394"/>
-            <a:ext cx="11004130" cy="2205570"/>
+            <a:off x="380704" y="1852439"/>
+            <a:ext cx="8364117" cy="419158"/>
           </a:xfrm>
           <a:prstGeom prst="rect">
             <a:avLst/>
           </a:prstGeom>
         </p:spPr>
       </p:pic>
-      <p:sp>
-        <p:nvSpPr>
-          <p:cNvPr id="7" name="矩形 6">
-            <a:extLst>
-              <a:ext uri="{FF2B5EF4-FFF2-40B4-BE49-F238E27FC236}">
-                <a16:creationId xmlns:a16="http://schemas.microsoft.com/office/drawing/2014/main" id="{E9937CFD-BD23-4C8F-A60F-275722FD778D}"/>
+      <p:pic>
+        <p:nvPicPr>
+          <p:cNvPr id="10" name="圖片 9">
+            <a:extLst>
+              <a:ext uri="{FF2B5EF4-FFF2-40B4-BE49-F238E27FC236}">
+                <a16:creationId xmlns:a16="http://schemas.microsoft.com/office/drawing/2014/main" id="{F0DD0B6C-ED5B-43CF-8A9A-2284301C1850}"/>
+              </a:ext>
+            </a:extLst>
+          </p:cNvPr>
+          <p:cNvPicPr>
+            <a:picLocks noChangeAspect="1"/>
+          </p:cNvPicPr>
+          <p:nvPr/>
+        </p:nvPicPr>
+        <p:blipFill>
+          <a:blip r:embed="rId3"/>
+          <a:stretch>
+            <a:fillRect/>
+          </a:stretch>
+        </p:blipFill>
+        <p:spPr>
+          <a:xfrm>
+            <a:off x="295672" y="2564513"/>
+            <a:ext cx="6073991" cy="3658872"/>
+          </a:xfrm>
+          <a:prstGeom prst="rect">
+            <a:avLst/>
+          </a:prstGeom>
+        </p:spPr>
+      </p:pic>
+      <p:sp>
+        <p:nvSpPr>
+          <p:cNvPr id="8" name="文字方塊 7">
+            <a:extLst>
+              <a:ext uri="{FF2B5EF4-FFF2-40B4-BE49-F238E27FC236}">
+                <a16:creationId xmlns:a16="http://schemas.microsoft.com/office/drawing/2014/main" id="{1F3AF44D-1604-4A24-A8D7-A266AB28CC17}"/>
+              </a:ext>
+            </a:extLst>
+          </p:cNvPr>
+          <p:cNvSpPr txBox="1"/>
+          <p:nvPr/>
+        </p:nvSpPr>
+        <p:spPr>
+          <a:xfrm>
+            <a:off x="5442457" y="2693238"/>
+            <a:ext cx="6336286" cy="369332"/>
+          </a:xfrm>
+          <a:prstGeom prst="rect">
+            <a:avLst/>
+          </a:prstGeom>
+          <a:noFill/>
+        </p:spPr>
+        <p:txBody>
+          <a:bodyPr wrap="none" rtlCol="0">
+            <a:spAutoFit/>
+          </a:bodyPr>
+          <a:lstStyle/>
+          <a:p>
+            <a:r>
+              <a:rPr lang="en-US" altLang="zh-TW" dirty="0">
+                <a:solidFill>
+                  <a:srgbClr val="FF0000"/>
+                </a:solidFill>
+                <a:latin typeface="-apple-system"/>
+              </a:rPr>
+              <a:t>\ps7_cortexa9_0\</a:t>
+            </a:r>
+            <a:r>
+              <a:rPr lang="en-US" altLang="zh-TW" dirty="0" err="1">
+                <a:solidFill>
+                  <a:srgbClr val="FF0000"/>
+                </a:solidFill>
+                <a:latin typeface="-apple-system"/>
+              </a:rPr>
+              <a:t>libsrc</a:t>
+            </a:r>
+            <a:r>
+              <a:rPr lang="en-US" altLang="zh-TW" dirty="0">
+                <a:solidFill>
+                  <a:srgbClr val="FF0000"/>
+                </a:solidFill>
+                <a:latin typeface="-apple-system"/>
+              </a:rPr>
+              <a:t>\standalone_v5_2\include\ </a:t>
+            </a:r>
+            <a:r>
+              <a:rPr lang="en-US" altLang="zh-TW" dirty="0" err="1">
+                <a:solidFill>
+                  <a:srgbClr val="FF0000"/>
+                </a:solidFill>
+                <a:latin typeface="-apple-system"/>
+              </a:rPr>
+              <a:t>xscugic_hw.h</a:t>
+            </a:r>
+            <a:endParaRPr lang="zh-TW" altLang="en-US" dirty="0">
+              <a:solidFill>
+                <a:srgbClr val="FF0000"/>
+              </a:solidFill>
+              <a:latin typeface="-apple-system"/>
+            </a:endParaRPr>
+          </a:p>
+        </p:txBody>
+      </p:sp>
+      <p:pic>
+        <p:nvPicPr>
+          <p:cNvPr id="11" name="圖片 10">
+            <a:extLst>
+              <a:ext uri="{FF2B5EF4-FFF2-40B4-BE49-F238E27FC236}">
+                <a16:creationId xmlns:a16="http://schemas.microsoft.com/office/drawing/2014/main" id="{8E020C61-2E6D-4332-B247-B96157289D18}"/>
+              </a:ext>
+            </a:extLst>
+          </p:cNvPr>
+          <p:cNvPicPr>
+            <a:picLocks noChangeAspect="1"/>
+          </p:cNvPicPr>
+          <p:nvPr/>
+        </p:nvPicPr>
+        <p:blipFill>
+          <a:blip r:embed="rId4"/>
+          <a:stretch>
+            <a:fillRect/>
+          </a:stretch>
+        </p:blipFill>
+        <p:spPr>
+          <a:xfrm>
+            <a:off x="5490878" y="3191294"/>
+            <a:ext cx="5487166" cy="2267266"/>
+          </a:xfrm>
+          <a:prstGeom prst="rect">
+            <a:avLst/>
+          </a:prstGeom>
+        </p:spPr>
+      </p:pic>
+      <p:sp>
+        <p:nvSpPr>
+          <p:cNvPr id="12" name="矩形 11">
+            <a:extLst>
+              <a:ext uri="{FF2B5EF4-FFF2-40B4-BE49-F238E27FC236}">
+                <a16:creationId xmlns:a16="http://schemas.microsoft.com/office/drawing/2014/main" id="{FDB0C7DE-4BD7-41CA-8B80-56433D6F6AC1}"/>
               </a:ext>
             </a:extLst>
           </p:cNvPr>
@@ -6404,8 +6761,8 @@
         </p:nvSpPr>
         <p:spPr>
           <a:xfrm>
-            <a:off x="1103664" y="4119418"/>
-            <a:ext cx="8917791" cy="434109"/>
+            <a:off x="5563375" y="3991815"/>
+            <a:ext cx="5012261" cy="183022"/>
           </a:xfrm>
           <a:prstGeom prst="rect">
             <a:avLst/>
@@ -6439,129 +6796,6 @@
           <a:p>
             <a:pPr algn="ctr"/>
             <a:endParaRPr lang="zh-TW" altLang="en-US"/>
-          </a:p>
-        </p:txBody>
-      </p:sp>
-      <p:sp>
-        <p:nvSpPr>
-          <p:cNvPr id="8" name="文字方塊 7">
-            <a:extLst>
-              <a:ext uri="{FF2B5EF4-FFF2-40B4-BE49-F238E27FC236}">
-                <a16:creationId xmlns:a16="http://schemas.microsoft.com/office/drawing/2014/main" id="{1F3AF44D-1604-4A24-A8D7-A266AB28CC17}"/>
-              </a:ext>
-            </a:extLst>
-          </p:cNvPr>
-          <p:cNvSpPr txBox="1"/>
-          <p:nvPr/>
-        </p:nvSpPr>
-        <p:spPr>
-          <a:xfrm>
-            <a:off x="1653831" y="2637222"/>
-            <a:ext cx="6336286" cy="369332"/>
-          </a:xfrm>
-          <a:prstGeom prst="rect">
-            <a:avLst/>
-          </a:prstGeom>
-          <a:noFill/>
-        </p:spPr>
-        <p:txBody>
-          <a:bodyPr wrap="none" rtlCol="0">
-            <a:spAutoFit/>
-          </a:bodyPr>
-          <a:lstStyle/>
-          <a:p>
-            <a:r>
-              <a:rPr lang="en-US" altLang="zh-TW" dirty="0">
-                <a:solidFill>
-                  <a:srgbClr val="FF0000"/>
-                </a:solidFill>
-                <a:latin typeface="-apple-system"/>
-              </a:rPr>
-              <a:t>\ps7_cortexa9_0\</a:t>
-            </a:r>
-            <a:r>
-              <a:rPr lang="en-US" altLang="zh-TW" dirty="0" err="1">
-                <a:solidFill>
-                  <a:srgbClr val="FF0000"/>
-                </a:solidFill>
-                <a:latin typeface="-apple-system"/>
-              </a:rPr>
-              <a:t>libsrc</a:t>
-            </a:r>
-            <a:r>
-              <a:rPr lang="en-US" altLang="zh-TW" dirty="0">
-                <a:solidFill>
-                  <a:srgbClr val="FF0000"/>
-                </a:solidFill>
-                <a:latin typeface="-apple-system"/>
-              </a:rPr>
-              <a:t>\standalone_v5_2\include\ </a:t>
-            </a:r>
-            <a:r>
-              <a:rPr lang="en-US" altLang="zh-TW" dirty="0" err="1">
-                <a:solidFill>
-                  <a:srgbClr val="FF0000"/>
-                </a:solidFill>
-                <a:latin typeface="-apple-system"/>
-              </a:rPr>
-              <a:t>xscugic_hw.h</a:t>
-            </a:r>
-            <a:endParaRPr lang="zh-TW" altLang="en-US" dirty="0">
-              <a:solidFill>
-                <a:srgbClr val="FF0000"/>
-              </a:solidFill>
-              <a:latin typeface="-apple-system"/>
-            </a:endParaRPr>
-          </a:p>
-        </p:txBody>
-      </p:sp>
-      <p:sp>
-        <p:nvSpPr>
-          <p:cNvPr id="9" name="文字方塊 8">
-            <a:extLst>
-              <a:ext uri="{FF2B5EF4-FFF2-40B4-BE49-F238E27FC236}">
-                <a16:creationId xmlns:a16="http://schemas.microsoft.com/office/drawing/2014/main" id="{370A3087-8A21-4252-9E23-2AE5AD8CF0BD}"/>
-              </a:ext>
-            </a:extLst>
-          </p:cNvPr>
-          <p:cNvSpPr txBox="1"/>
-          <p:nvPr/>
-        </p:nvSpPr>
-        <p:spPr>
-          <a:xfrm>
-            <a:off x="838198" y="1190191"/>
-            <a:ext cx="10515600" cy="369332"/>
-          </a:xfrm>
-          <a:prstGeom prst="rect">
-            <a:avLst/>
-          </a:prstGeom>
-          <a:noFill/>
-        </p:spPr>
-        <p:txBody>
-          <a:bodyPr wrap="square">
-            <a:spAutoFit/>
-          </a:bodyPr>
-          <a:lstStyle/>
-          <a:p>
-            <a:pPr marL="285750" indent="-285750">
-              <a:buFont typeface="Wingdings" panose="05000000000000000000" pitchFamily="2" charset="2"/>
-              <a:buChar char="n"/>
-            </a:pPr>
-            <a:r>
-              <a:rPr lang="en-US" altLang="zh-TW" dirty="0"/>
-              <a:t>GIC MASK</a:t>
-            </a:r>
-            <a:r>
-              <a:rPr lang="zh-TW" altLang="en-US" dirty="0">
-                <a:latin typeface="標楷體" panose="03000509000000000000" pitchFamily="65" charset="-120"/>
-                <a:ea typeface="標楷體" panose="03000509000000000000" pitchFamily="65" charset="-120"/>
-              </a:rPr>
-              <a:t>暫存器</a:t>
-            </a:r>
-            <a:endParaRPr lang="en-US" altLang="zh-TW" dirty="0">
-              <a:latin typeface="標楷體" panose="03000509000000000000" pitchFamily="65" charset="-120"/>
-              <a:ea typeface="標楷體" panose="03000509000000000000" pitchFamily="65" charset="-120"/>
-            </a:endParaRPr>
           </a:p>
         </p:txBody>
       </p:sp>
@@ -6661,103 +6895,124 @@
           </a:p>
         </p:txBody>
       </p:sp>
-      <p:pic>
-        <p:nvPicPr>
-          <p:cNvPr id="2" name="圖片 1">
-            <a:extLst>
-              <a:ext uri="{FF2B5EF4-FFF2-40B4-BE49-F238E27FC236}">
-                <a16:creationId xmlns:a16="http://schemas.microsoft.com/office/drawing/2014/main" id="{B8DB12EE-F73E-4165-A2DE-38D9DAB2FB69}"/>
-              </a:ext>
-            </a:extLst>
-          </p:cNvPr>
-          <p:cNvPicPr>
-            <a:picLocks noChangeAspect="1"/>
-          </p:cNvPicPr>
+      <p:grpSp>
+        <p:nvGrpSpPr>
+          <p:cNvPr id="5" name="群組 4">
+            <a:extLst>
+              <a:ext uri="{FF2B5EF4-FFF2-40B4-BE49-F238E27FC236}">
+                <a16:creationId xmlns:a16="http://schemas.microsoft.com/office/drawing/2014/main" id="{D18D8A2F-634E-4022-B92C-ABC26421FCC4}"/>
+              </a:ext>
+            </a:extLst>
+          </p:cNvPr>
+          <p:cNvGrpSpPr/>
           <p:nvPr/>
-        </p:nvPicPr>
-        <p:blipFill>
-          <a:blip r:embed="rId2"/>
-          <a:stretch>
-            <a:fillRect/>
-          </a:stretch>
-        </p:blipFill>
+        </p:nvGrpSpPr>
+        <p:grpSpPr>
+          <a:xfrm>
+            <a:off x="5412439" y="2511768"/>
+            <a:ext cx="6188434" cy="2946800"/>
+            <a:chOff x="3571871" y="1994606"/>
+            <a:chExt cx="7893058" cy="3560778"/>
+          </a:xfrm>
+        </p:grpSpPr>
+        <p:pic>
+          <p:nvPicPr>
+            <p:cNvPr id="2" name="圖片 1">
+              <a:extLst>
+                <a:ext uri="{FF2B5EF4-FFF2-40B4-BE49-F238E27FC236}">
+                  <a16:creationId xmlns:a16="http://schemas.microsoft.com/office/drawing/2014/main" id="{B8DB12EE-F73E-4165-A2DE-38D9DAB2FB69}"/>
+                </a:ext>
+              </a:extLst>
+            </p:cNvPr>
+            <p:cNvPicPr>
+              <a:picLocks noChangeAspect="1"/>
+            </p:cNvPicPr>
+            <p:nvPr/>
+          </p:nvPicPr>
+          <p:blipFill>
+            <a:blip r:embed="rId2"/>
+            <a:stretch>
+              <a:fillRect/>
+            </a:stretch>
+          </p:blipFill>
+          <p:spPr>
+            <a:xfrm>
+              <a:off x="3571871" y="1994606"/>
+              <a:ext cx="7893058" cy="3560778"/>
+            </a:xfrm>
+            <a:prstGeom prst="rect">
+              <a:avLst/>
+            </a:prstGeom>
+          </p:spPr>
+        </p:pic>
+        <p:sp>
+          <p:nvSpPr>
+            <p:cNvPr id="6" name="矩形 5">
+              <a:extLst>
+                <a:ext uri="{FF2B5EF4-FFF2-40B4-BE49-F238E27FC236}">
+                  <a16:creationId xmlns:a16="http://schemas.microsoft.com/office/drawing/2014/main" id="{CA7E3AFD-332E-4C41-BE73-CEA9F571729B}"/>
+                </a:ext>
+              </a:extLst>
+            </p:cNvPr>
+            <p:cNvSpPr/>
+            <p:nvPr/>
+          </p:nvSpPr>
+          <p:spPr>
+            <a:xfrm>
+              <a:off x="3643664" y="3666836"/>
+              <a:ext cx="7821265" cy="230909"/>
+            </a:xfrm>
+            <a:prstGeom prst="rect">
+              <a:avLst/>
+            </a:prstGeom>
+            <a:noFill/>
+            <a:ln w="19050">
+              <a:solidFill>
+                <a:srgbClr val="FF0000"/>
+              </a:solidFill>
+            </a:ln>
+          </p:spPr>
+          <p:style>
+            <a:lnRef idx="2">
+              <a:schemeClr val="accent1">
+                <a:shade val="50000"/>
+              </a:schemeClr>
+            </a:lnRef>
+            <a:fillRef idx="1">
+              <a:schemeClr val="accent1"/>
+            </a:fillRef>
+            <a:effectRef idx="0">
+              <a:schemeClr val="accent1"/>
+            </a:effectRef>
+            <a:fontRef idx="minor">
+              <a:schemeClr val="lt1"/>
+            </a:fontRef>
+          </p:style>
+          <p:txBody>
+            <a:bodyPr rtlCol="0" anchor="ctr"/>
+            <a:lstStyle/>
+            <a:p>
+              <a:pPr algn="ctr"/>
+              <a:endParaRPr lang="zh-TW" altLang="en-US"/>
+            </a:p>
+          </p:txBody>
+        </p:sp>
+      </p:grpSp>
+      <p:sp>
+        <p:nvSpPr>
+          <p:cNvPr id="7" name="文字方塊 6">
+            <a:extLst>
+              <a:ext uri="{FF2B5EF4-FFF2-40B4-BE49-F238E27FC236}">
+                <a16:creationId xmlns:a16="http://schemas.microsoft.com/office/drawing/2014/main" id="{4A1B081B-E346-41D0-B70F-F4BF2B41BDBE}"/>
+              </a:ext>
+            </a:extLst>
+          </p:cNvPr>
+          <p:cNvSpPr txBox="1"/>
+          <p:nvPr/>
+        </p:nvSpPr>
         <p:spPr>
           <a:xfrm>
-            <a:off x="2149471" y="1994606"/>
-            <a:ext cx="7893058" cy="3560778"/>
-          </a:xfrm>
-          <a:prstGeom prst="rect">
-            <a:avLst/>
-          </a:prstGeom>
-        </p:spPr>
-      </p:pic>
-      <p:sp>
-        <p:nvSpPr>
-          <p:cNvPr id="6" name="矩形 5">
-            <a:extLst>
-              <a:ext uri="{FF2B5EF4-FFF2-40B4-BE49-F238E27FC236}">
-                <a16:creationId xmlns:a16="http://schemas.microsoft.com/office/drawing/2014/main" id="{CA7E3AFD-332E-4C41-BE73-CEA9F571729B}"/>
-              </a:ext>
-            </a:extLst>
-          </p:cNvPr>
-          <p:cNvSpPr/>
-          <p:nvPr/>
-        </p:nvSpPr>
-        <p:spPr>
-          <a:xfrm>
-            <a:off x="2221264" y="3666836"/>
-            <a:ext cx="7821265" cy="230909"/>
-          </a:xfrm>
-          <a:prstGeom prst="rect">
-            <a:avLst/>
-          </a:prstGeom>
-          <a:noFill/>
-          <a:ln w="19050">
-            <a:solidFill>
-              <a:srgbClr val="FF0000"/>
-            </a:solidFill>
-          </a:ln>
-        </p:spPr>
-        <p:style>
-          <a:lnRef idx="2">
-            <a:schemeClr val="accent1">
-              <a:shade val="50000"/>
-            </a:schemeClr>
-          </a:lnRef>
-          <a:fillRef idx="1">
-            <a:schemeClr val="accent1"/>
-          </a:fillRef>
-          <a:effectRef idx="0">
-            <a:schemeClr val="accent1"/>
-          </a:effectRef>
-          <a:fontRef idx="minor">
-            <a:schemeClr val="lt1"/>
-          </a:fontRef>
-        </p:style>
-        <p:txBody>
-          <a:bodyPr rtlCol="0" anchor="ctr"/>
-          <a:lstStyle/>
-          <a:p>
-            <a:pPr algn="ctr"/>
-            <a:endParaRPr lang="zh-TW" altLang="en-US"/>
-          </a:p>
-        </p:txBody>
-      </p:sp>
-      <p:sp>
-        <p:nvSpPr>
-          <p:cNvPr id="7" name="文字方塊 6">
-            <a:extLst>
-              <a:ext uri="{FF2B5EF4-FFF2-40B4-BE49-F238E27FC236}">
-                <a16:creationId xmlns:a16="http://schemas.microsoft.com/office/drawing/2014/main" id="{4A1B081B-E346-41D0-B70F-F4BF2B41BDBE}"/>
-              </a:ext>
-            </a:extLst>
-          </p:cNvPr>
-          <p:cNvSpPr txBox="1"/>
-          <p:nvPr/>
-        </p:nvSpPr>
-        <p:spPr>
-          <a:xfrm>
-            <a:off x="2927857" y="1516759"/>
+            <a:off x="4350257" y="1516759"/>
             <a:ext cx="6336286" cy="369332"/>
           </a:xfrm>
           <a:prstGeom prst="rect">
@@ -6866,6 +7121,66 @@
           </a:p>
         </p:txBody>
       </p:sp>
+      <p:pic>
+        <p:nvPicPr>
+          <p:cNvPr id="9" name="圖片 8">
+            <a:extLst>
+              <a:ext uri="{FF2B5EF4-FFF2-40B4-BE49-F238E27FC236}">
+                <a16:creationId xmlns:a16="http://schemas.microsoft.com/office/drawing/2014/main" id="{DE8048A4-D698-4C35-9F3A-5704F927B216}"/>
+              </a:ext>
+            </a:extLst>
+          </p:cNvPr>
+          <p:cNvPicPr>
+            <a:picLocks noChangeAspect="1"/>
+          </p:cNvPicPr>
+          <p:nvPr/>
+        </p:nvPicPr>
+        <p:blipFill>
+          <a:blip r:embed="rId3"/>
+          <a:stretch>
+            <a:fillRect/>
+          </a:stretch>
+        </p:blipFill>
+        <p:spPr>
+          <a:xfrm>
+            <a:off x="0" y="2632984"/>
+            <a:ext cx="6549301" cy="310430"/>
+          </a:xfrm>
+          <a:prstGeom prst="rect">
+            <a:avLst/>
+          </a:prstGeom>
+        </p:spPr>
+      </p:pic>
+      <p:pic>
+        <p:nvPicPr>
+          <p:cNvPr id="10" name="圖片 9">
+            <a:extLst>
+              <a:ext uri="{FF2B5EF4-FFF2-40B4-BE49-F238E27FC236}">
+                <a16:creationId xmlns:a16="http://schemas.microsoft.com/office/drawing/2014/main" id="{82AF1327-C500-493C-9282-75620630B0FD}"/>
+              </a:ext>
+            </a:extLst>
+          </p:cNvPr>
+          <p:cNvPicPr>
+            <a:picLocks noChangeAspect="1"/>
+          </p:cNvPicPr>
+          <p:nvPr/>
+        </p:nvPicPr>
+        <p:blipFill>
+          <a:blip r:embed="rId4"/>
+          <a:stretch>
+            <a:fillRect/>
+          </a:stretch>
+        </p:blipFill>
+        <p:spPr>
+          <a:xfrm>
+            <a:off x="591127" y="3064630"/>
+            <a:ext cx="4509872" cy="3109912"/>
+          </a:xfrm>
+          <a:prstGeom prst="rect">
+            <a:avLst/>
+          </a:prstGeom>
+        </p:spPr>
+      </p:pic>
     </p:spTree>
     <p:extLst>
       <p:ext uri="{BB962C8B-B14F-4D97-AF65-F5344CB8AC3E}">
@@ -15547,7 +15862,7 @@
         </p:blipFill>
         <p:spPr bwMode="auto">
           <a:xfrm>
-            <a:off x="429148" y="1764145"/>
+            <a:off x="429148" y="1422400"/>
             <a:ext cx="6770940" cy="4350328"/>
           </a:xfrm>
           <a:prstGeom prst="rect">
@@ -15632,7 +15947,7 @@
         </p:nvSpPr>
         <p:spPr>
           <a:xfrm>
-            <a:off x="4374096" y="3517537"/>
+            <a:off x="4374096" y="3175792"/>
             <a:ext cx="1955122" cy="203200"/>
           </a:xfrm>
           <a:prstGeom prst="rect">
@@ -15692,7 +16007,7 @@
         </p:blipFill>
         <p:spPr>
           <a:xfrm>
-            <a:off x="7029811" y="2327564"/>
+            <a:off x="7029811" y="1244092"/>
             <a:ext cx="4937979" cy="3170060"/>
           </a:xfrm>
           <a:prstGeom prst="rect">
@@ -15714,7 +16029,7 @@
         </p:nvSpPr>
         <p:spPr>
           <a:xfrm>
-            <a:off x="7029811" y="4847608"/>
+            <a:off x="7029811" y="3764136"/>
             <a:ext cx="4937979" cy="312057"/>
           </a:xfrm>
           <a:prstGeom prst="rect">
@@ -15748,10 +16063,122 @@
           <a:lstStyle/>
           <a:p>
             <a:pPr algn="ctr"/>
-            <a:endParaRPr lang="zh-TW" altLang="en-US"/>
-          </a:p>
-        </p:txBody>
-      </p:sp>
+            <a:endParaRPr lang="zh-TW" altLang="en-US" dirty="0"/>
+          </a:p>
+        </p:txBody>
+      </p:sp>
+      <p:pic>
+        <p:nvPicPr>
+          <p:cNvPr id="2" name="圖片 1">
+            <a:extLst>
+              <a:ext uri="{FF2B5EF4-FFF2-40B4-BE49-F238E27FC236}">
+                <a16:creationId xmlns:a16="http://schemas.microsoft.com/office/drawing/2014/main" id="{6CC922B4-AD42-44FC-BD5F-2B1C0FFAC29C}"/>
+              </a:ext>
+            </a:extLst>
+          </p:cNvPr>
+          <p:cNvPicPr>
+            <a:picLocks noChangeAspect="1"/>
+          </p:cNvPicPr>
+          <p:nvPr/>
+        </p:nvPicPr>
+        <p:blipFill>
+          <a:blip r:embed="rId4"/>
+          <a:stretch>
+            <a:fillRect/>
+          </a:stretch>
+        </p:blipFill>
+        <p:spPr>
+          <a:xfrm>
+            <a:off x="7598023" y="4239491"/>
+            <a:ext cx="3898978" cy="2567268"/>
+          </a:xfrm>
+          <a:prstGeom prst="rect">
+            <a:avLst/>
+          </a:prstGeom>
+        </p:spPr>
+      </p:pic>
+      <p:sp>
+        <p:nvSpPr>
+          <p:cNvPr id="11" name="矩形 10">
+            <a:extLst>
+              <a:ext uri="{FF2B5EF4-FFF2-40B4-BE49-F238E27FC236}">
+                <a16:creationId xmlns:a16="http://schemas.microsoft.com/office/drawing/2014/main" id="{389681B5-AD69-42C6-8F7E-9F1DEC1F7D19}"/>
+              </a:ext>
+            </a:extLst>
+          </p:cNvPr>
+          <p:cNvSpPr/>
+          <p:nvPr/>
+        </p:nvSpPr>
+        <p:spPr>
+          <a:xfrm>
+            <a:off x="7598023" y="4573119"/>
+            <a:ext cx="3755777" cy="469936"/>
+          </a:xfrm>
+          <a:prstGeom prst="rect">
+            <a:avLst/>
+          </a:prstGeom>
+          <a:noFill/>
+          <a:ln w="38100">
+            <a:solidFill>
+              <a:srgbClr val="FF0000"/>
+            </a:solidFill>
+          </a:ln>
+        </p:spPr>
+        <p:style>
+          <a:lnRef idx="2">
+            <a:schemeClr val="accent1">
+              <a:shade val="50000"/>
+            </a:schemeClr>
+          </a:lnRef>
+          <a:fillRef idx="1">
+            <a:schemeClr val="accent1"/>
+          </a:fillRef>
+          <a:effectRef idx="0">
+            <a:schemeClr val="accent1"/>
+          </a:effectRef>
+          <a:fontRef idx="minor">
+            <a:schemeClr val="lt1"/>
+          </a:fontRef>
+        </p:style>
+        <p:txBody>
+          <a:bodyPr rtlCol="0" anchor="ctr"/>
+          <a:lstStyle/>
+          <a:p>
+            <a:pPr algn="ctr"/>
+            <a:endParaRPr lang="zh-TW" altLang="en-US" dirty="0"/>
+          </a:p>
+        </p:txBody>
+      </p:sp>
+      <p:pic>
+        <p:nvPicPr>
+          <p:cNvPr id="12" name="圖片 11">
+            <a:extLst>
+              <a:ext uri="{FF2B5EF4-FFF2-40B4-BE49-F238E27FC236}">
+                <a16:creationId xmlns:a16="http://schemas.microsoft.com/office/drawing/2014/main" id="{6F811817-AD94-423B-9D7B-A3C39EAE53A7}"/>
+              </a:ext>
+            </a:extLst>
+          </p:cNvPr>
+          <p:cNvPicPr>
+            <a:picLocks noChangeAspect="1"/>
+          </p:cNvPicPr>
+          <p:nvPr/>
+        </p:nvPicPr>
+        <p:blipFill>
+          <a:blip r:embed="rId5"/>
+          <a:stretch>
+            <a:fillRect/>
+          </a:stretch>
+        </p:blipFill>
+        <p:spPr>
+          <a:xfrm>
+            <a:off x="928217" y="5933470"/>
+            <a:ext cx="5401001" cy="908872"/>
+          </a:xfrm>
+          <a:prstGeom prst="rect">
+            <a:avLst/>
+          </a:prstGeom>
+        </p:spPr>
+      </p:pic>
     </p:spTree>
     <p:extLst>
       <p:ext uri="{BB962C8B-B14F-4D97-AF65-F5344CB8AC3E}">

</xml_diff>